<commit_message>
DOC: add small link to brain image
</commit_message>
<xml_diff>
--- a/2013_imagen_anat_vgwas_gpu/presentation.pptx
+++ b/2013_imagen_anat_vgwas_gpu/presentation.pptx
@@ -935,7 +935,7 @@
   <p:cSld>
     <p:spTree>
       <p:nvGrpSpPr>
-        <p:cNvPr id="175" name="Shape 175"/>
+        <p:cNvPr id="176" name="Shape 176"/>
         <p:cNvGrpSpPr/>
         <p:nvPr/>
       </p:nvGrpSpPr>
@@ -949,7 +949,7 @@
       </p:grpSpPr>
       <p:sp>
         <p:nvSpPr>
-          <p:cNvPr id="176" name="Shape 176"/>
+          <p:cNvPr id="177" name="Shape 177"/>
           <p:cNvSpPr/>
           <p:nvPr>
             <p:ph idx="2" type="sldImg"/>
@@ -983,7 +983,7 @@
       </p:sp>
       <p:sp>
         <p:nvSpPr>
-          <p:cNvPr id="177" name="Shape 177"/>
+          <p:cNvPr id="178" name="Shape 178"/>
           <p:cNvSpPr txBox="1"/>
           <p:nvPr>
             <p:ph idx="1" type="body"/>
@@ -1019,7 +1019,7 @@
   <p:cSld>
     <p:spTree>
       <p:nvGrpSpPr>
-        <p:cNvPr id="181" name="Shape 181"/>
+        <p:cNvPr id="183" name="Shape 183"/>
         <p:cNvGrpSpPr/>
         <p:nvPr/>
       </p:nvGrpSpPr>
@@ -1033,7 +1033,7 @@
       </p:grpSpPr>
       <p:sp>
         <p:nvSpPr>
-          <p:cNvPr id="182" name="Shape 182"/>
+          <p:cNvPr id="184" name="Shape 184"/>
           <p:cNvSpPr/>
           <p:nvPr>
             <p:ph idx="2" type="sldImg"/>
@@ -1067,7 +1067,7 @@
       </p:sp>
       <p:sp>
         <p:nvSpPr>
-          <p:cNvPr id="183" name="Shape 183"/>
+          <p:cNvPr id="185" name="Shape 185"/>
           <p:cNvSpPr txBox="1"/>
           <p:nvPr>
             <p:ph idx="1" type="body"/>
@@ -4749,12 +4749,18 @@
           <a:chExt cy="0" cx="0"/>
         </a:xfrm>
       </p:grpSpPr>
-      <p:sp>
-        <p:nvSpPr>
+      <p:pic>
+        <p:nvPicPr>
           <p:cNvPr id="103" name="Shape 103"/>
-          <p:cNvSpPr/>
-          <p:nvPr/>
-        </p:nvSpPr>
+          <p:cNvPicPr preferRelativeResize="0"/>
+          <p:nvPr/>
+        </p:nvPicPr>
+        <p:blipFill>
+          <a:blip r:embed="rId3"/>
+          <a:stretch>
+            <a:fillRect/>
+          </a:stretch>
+        </p:blipFill>
         <p:spPr>
           <a:xfrm>
             <a:off y="2876437" x="90799"/>
@@ -4763,17 +4769,12 @@
           <a:prstGeom prst="rect">
             <a:avLst/>
           </a:prstGeom>
-          <a:blipFill>
-            <a:blip r:embed="rId3"/>
-            <a:stretch>
-              <a:fillRect/>
-            </a:stretch>
-          </a:blipFill>
+          <a:noFill/>
           <a:ln>
             <a:noFill/>
           </a:ln>
         </p:spPr>
-      </p:sp>
+      </p:pic>
       <p:sp>
         <p:nvSpPr>
           <p:cNvPr id="104" name="Shape 104"/>
@@ -5375,12 +5376,18 @@
           </a:p>
         </p:txBody>
       </p:sp>
-      <p:sp>
-        <p:nvSpPr>
+      <p:pic>
+        <p:nvPicPr>
           <p:cNvPr id="128" name="Shape 128"/>
-          <p:cNvSpPr/>
-          <p:nvPr/>
-        </p:nvSpPr>
+          <p:cNvPicPr preferRelativeResize="0"/>
+          <p:nvPr/>
+        </p:nvPicPr>
+        <p:blipFill>
+          <a:blip r:embed="rId3"/>
+          <a:stretch>
+            <a:fillRect/>
+          </a:stretch>
+        </p:blipFill>
         <p:spPr>
           <a:xfrm>
             <a:off y="1774912" x="259499"/>
@@ -5389,17 +5396,12 @@
           <a:prstGeom prst="rect">
             <a:avLst/>
           </a:prstGeom>
-          <a:blipFill>
-            <a:blip r:embed="rId3"/>
-            <a:stretch>
-              <a:fillRect/>
-            </a:stretch>
-          </a:blipFill>
+          <a:noFill/>
           <a:ln>
             <a:noFill/>
           </a:ln>
         </p:spPr>
-      </p:sp>
+      </p:pic>
       <p:cxnSp>
         <p:nvCxnSpPr>
           <p:cNvPr id="129" name="Shape 129"/>
@@ -6159,12 +6161,18 @@
           </a:p>
         </p:txBody>
       </p:sp>
-      <p:sp>
-        <p:nvSpPr>
+      <p:pic>
+        <p:nvPicPr>
           <p:cNvPr id="158" name="Shape 158"/>
-          <p:cNvSpPr/>
-          <p:nvPr/>
-        </p:nvSpPr>
+          <p:cNvPicPr preferRelativeResize="0"/>
+          <p:nvPr/>
+        </p:nvPicPr>
+        <p:blipFill>
+          <a:blip r:embed="rId3"/>
+          <a:stretch>
+            <a:fillRect/>
+          </a:stretch>
+        </p:blipFill>
         <p:spPr>
           <a:xfrm>
             <a:off y="2460051" x="5082400"/>
@@ -6173,17 +6181,12 @@
           <a:prstGeom prst="rect">
             <a:avLst/>
           </a:prstGeom>
-          <a:blipFill>
-            <a:blip r:embed="rId3"/>
-            <a:stretch>
-              <a:fillRect/>
-            </a:stretch>
-          </a:blipFill>
+          <a:noFill/>
           <a:ln>
             <a:noFill/>
           </a:ln>
         </p:spPr>
-      </p:sp>
+      </p:pic>
     </p:spTree>
   </p:cSld>
   <p:clrMapOvr>
@@ -6245,12 +6248,18 @@
           </a:p>
         </p:txBody>
       </p:sp>
-      <p:sp>
-        <p:nvSpPr>
+      <p:pic>
+        <p:nvPicPr>
           <p:cNvPr id="164" name="Shape 164"/>
-          <p:cNvSpPr/>
-          <p:nvPr/>
-        </p:nvSpPr>
+          <p:cNvPicPr preferRelativeResize="0"/>
+          <p:nvPr/>
+        </p:nvPicPr>
+        <p:blipFill>
+          <a:blip r:embed="rId3"/>
+          <a:stretch>
+            <a:fillRect/>
+          </a:stretch>
+        </p:blipFill>
         <p:spPr>
           <a:xfrm>
             <a:off y="1319212" x="533400"/>
@@ -6259,20 +6268,20 @@
           <a:prstGeom prst="rect">
             <a:avLst/>
           </a:prstGeom>
-          <a:blipFill>
-            <a:blip r:embed="rId3"/>
-            <a:stretch>
-              <a:fillRect/>
-            </a:stretch>
-          </a:blipFill>
-        </p:spPr>
-      </p:sp>
-      <p:sp>
-        <p:nvSpPr>
+        </p:spPr>
+      </p:pic>
+      <p:pic>
+        <p:nvPicPr>
           <p:cNvPr id="165" name="Shape 165"/>
-          <p:cNvSpPr/>
-          <p:nvPr/>
-        </p:nvSpPr>
+          <p:cNvPicPr preferRelativeResize="0"/>
+          <p:nvPr/>
+        </p:nvPicPr>
+        <p:blipFill>
+          <a:blip r:embed="rId4"/>
+          <a:stretch>
+            <a:fillRect/>
+          </a:stretch>
+        </p:blipFill>
         <p:spPr>
           <a:xfrm>
             <a:off y="1946550" x="533400"/>
@@ -6281,14 +6290,8 @@
           <a:prstGeom prst="rect">
             <a:avLst/>
           </a:prstGeom>
-          <a:blipFill>
-            <a:blip r:embed="rId4"/>
-            <a:stretch>
-              <a:fillRect/>
-            </a:stretch>
-          </a:blipFill>
-        </p:spPr>
-      </p:sp>
+        </p:spPr>
+      </p:pic>
       <p:sp>
         <p:nvSpPr>
           <p:cNvPr id="166" name="Shape 166"/>
@@ -6437,27 +6440,58 @@
           </a:p>
         </p:txBody>
       </p:sp>
-      <p:sp>
-        <p:nvSpPr>
+      <p:pic>
+        <p:nvPicPr>
           <p:cNvPr id="174" name="Shape 174"/>
-          <p:cNvSpPr/>
-          <p:nvPr/>
-        </p:nvSpPr>
-        <p:spPr>
-          <a:xfrm>
-            <a:off y="1569575" x="699825"/>
+          <p:cNvPicPr preferRelativeResize="0"/>
+          <p:nvPr/>
+        </p:nvPicPr>
+        <p:blipFill>
+          <a:blip r:embed="rId3"/>
+          <a:stretch>
+            <a:fillRect/>
+          </a:stretch>
+        </p:blipFill>
+        <p:spPr>
+          <a:xfrm>
+            <a:off y="1264775" x="699825"/>
             <a:ext cy="3013949" cx="7842748"/>
           </a:xfrm>
           <a:prstGeom prst="rect">
             <a:avLst/>
           </a:prstGeom>
-          <a:blipFill>
-            <a:blip r:embed="rId3"/>
-            <a:stretch>
-              <a:fillRect/>
-            </a:stretch>
-          </a:blipFill>
-        </p:spPr>
+        </p:spPr>
+      </p:pic>
+      <p:sp>
+        <p:nvSpPr>
+          <p:cNvPr id="175" name="Shape 175"/>
+          <p:cNvSpPr txBox="1"/>
+          <p:nvPr/>
+        </p:nvSpPr>
+        <p:spPr>
+          <a:xfrm>
+            <a:off y="4470375" x="436350"/>
+            <a:ext cy="457200" cx="8250299"/>
+          </a:xfrm>
+          <a:prstGeom prst="rect">
+            <a:avLst/>
+          </a:prstGeom>
+        </p:spPr>
+        <p:txBody>
+          <a:bodyPr bIns="91425" rIns="91425" lIns="91425" tIns="91425" anchor="t" anchorCtr="0">
+            <a:noAutofit/>
+          </a:bodyPr>
+          <a:lstStyle/>
+          <a:p>
+            <a:pPr rtl="0" lvl="0">
+              <a:buNone/>
+            </a:pPr>
+            <a:r>
+              <a:rPr sz="1100" lang="en"/>
+              <a:t>Created by https://github.com/neurospin/scripts/blob/master/2013_imagen_anat_vgwas_gpu/scripts/04_post_process_on_pc/create_brain.py</a:t>
+            </a:r>
+          </a:p>
+        </p:txBody>
       </p:sp>
     </p:spTree>
   </p:cSld>
@@ -6475,7 +6509,7 @@
   <p:cSld>
     <p:spTree>
       <p:nvGrpSpPr>
-        <p:cNvPr id="178" name="Shape 178"/>
+        <p:cNvPr id="179" name="Shape 179"/>
         <p:cNvGrpSpPr/>
         <p:nvPr/>
       </p:nvGrpSpPr>
@@ -6489,7 +6523,7 @@
       </p:grpSpPr>
       <p:sp>
         <p:nvSpPr>
-          <p:cNvPr id="179" name="Shape 179"/>
+          <p:cNvPr id="180" name="Shape 180"/>
           <p:cNvSpPr txBox="1"/>
           <p:nvPr>
             <p:ph type="title"/>
@@ -6520,27 +6554,58 @@
           </a:p>
         </p:txBody>
       </p:sp>
-      <p:sp>
-        <p:nvSpPr>
-          <p:cNvPr id="180" name="Shape 180"/>
-          <p:cNvSpPr/>
-          <p:nvPr/>
-        </p:nvSpPr>
-        <p:spPr>
-          <a:xfrm>
-            <a:off y="1514174" x="600274"/>
+      <p:pic>
+        <p:nvPicPr>
+          <p:cNvPr id="181" name="Shape 181"/>
+          <p:cNvPicPr preferRelativeResize="0"/>
+          <p:nvPr/>
+        </p:nvPicPr>
+        <p:blipFill>
+          <a:blip r:embed="rId3"/>
+          <a:stretch>
+            <a:fillRect/>
+          </a:stretch>
+        </p:blipFill>
+        <p:spPr>
+          <a:xfrm>
+            <a:off y="1133174" x="600274"/>
             <a:ext cy="3158224" cx="8202373"/>
           </a:xfrm>
           <a:prstGeom prst="rect">
             <a:avLst/>
           </a:prstGeom>
-          <a:blipFill>
-            <a:blip r:embed="rId3"/>
-            <a:stretch>
-              <a:fillRect/>
-            </a:stretch>
-          </a:blipFill>
-        </p:spPr>
+        </p:spPr>
+      </p:pic>
+      <p:sp>
+        <p:nvSpPr>
+          <p:cNvPr id="182" name="Shape 182"/>
+          <p:cNvSpPr txBox="1"/>
+          <p:nvPr/>
+        </p:nvSpPr>
+        <p:spPr>
+          <a:xfrm>
+            <a:off y="4470375" x="436350"/>
+            <a:ext cy="457200" cx="8250299"/>
+          </a:xfrm>
+          <a:prstGeom prst="rect">
+            <a:avLst/>
+          </a:prstGeom>
+        </p:spPr>
+        <p:txBody>
+          <a:bodyPr bIns="91425" rIns="91425" lIns="91425" tIns="91425" anchor="t" anchorCtr="0">
+            <a:noAutofit/>
+          </a:bodyPr>
+          <a:lstStyle/>
+          <a:p>
+            <a:pPr>
+              <a:buNone/>
+            </a:pPr>
+            <a:r>
+              <a:rPr sz="1100" lang="en"/>
+              <a:t>Created by https://github.com/neurospin/scripts/blob/master/2013_imagen_anat_vgwas_gpu/scripts/04_post_process_on_pc/create_brain.py</a:t>
+            </a:r>
+          </a:p>
+        </p:txBody>
       </p:sp>
     </p:spTree>
   </p:cSld>

</xml_diff>